<commit_message>
vault backup: 2024-05-24 15:25:32
</commit_message>
<xml_diff>
--- a/Master Thesis/Weekly updates/Weekly_Update_14.pptx
+++ b/Master Thesis/Weekly updates/Weekly_Update_14.pptx
@@ -209,7 +209,7 @@
           <a:p>
             <a:fld id="{6D3852C0-B3AD-422A-8AC7-999B4B96542A}" type="datetimeFigureOut">
               <a:rPr lang="en-GB" smtClean="0"/>
-              <a:t>16/05/2024</a:t>
+              <a:t>21/05/2024</a:t>
             </a:fld>
             <a:endParaRPr lang="en-GB"/>
           </a:p>
@@ -626,7 +626,7 @@
           <a:p>
             <a:fld id="{DCC458E6-68E5-4178-872D-0F851C97ED69}" type="datetime1">
               <a:rPr lang="en-GB" smtClean="0"/>
-              <a:t>16/05/2024</a:t>
+              <a:t>21/05/2024</a:t>
             </a:fld>
             <a:endParaRPr lang="en-GB"/>
           </a:p>
@@ -829,7 +829,7 @@
           <a:p>
             <a:fld id="{07F27954-6BA2-48F8-8324-E7B42E1DF6B8}" type="datetime1">
               <a:rPr lang="en-GB" smtClean="0"/>
-              <a:t>16/05/2024</a:t>
+              <a:t>21/05/2024</a:t>
             </a:fld>
             <a:endParaRPr lang="en-GB"/>
           </a:p>
@@ -1042,7 +1042,7 @@
           <a:p>
             <a:fld id="{5A5D4326-195C-4919-8134-94385E9DEDD3}" type="datetime1">
               <a:rPr lang="en-GB" smtClean="0"/>
-              <a:t>16/05/2024</a:t>
+              <a:t>21/05/2024</a:t>
             </a:fld>
             <a:endParaRPr lang="en-GB"/>
           </a:p>
@@ -1269,7 +1269,7 @@
           <a:p>
             <a:fld id="{A409CA08-C688-4736-B48D-54330E3B0660}" type="datetime1">
               <a:rPr lang="en-GB" smtClean="0"/>
-              <a:t>16/05/2024</a:t>
+              <a:t>21/05/2024</a:t>
             </a:fld>
             <a:endParaRPr lang="en-GB"/>
           </a:p>
@@ -1548,7 +1548,7 @@
           <a:p>
             <a:fld id="{98BA2959-0F8E-4F90-871A-8F5FD7C39EC8}" type="datetime1">
               <a:rPr lang="en-GB" smtClean="0"/>
-              <a:t>16/05/2024</a:t>
+              <a:t>21/05/2024</a:t>
             </a:fld>
             <a:endParaRPr lang="en-GB"/>
           </a:p>
@@ -1819,7 +1819,7 @@
           <a:p>
             <a:fld id="{BEA47246-D1ED-490C-B907-18BC78CE6760}" type="datetime1">
               <a:rPr lang="en-GB" smtClean="0"/>
-              <a:t>16/05/2024</a:t>
+              <a:t>21/05/2024</a:t>
             </a:fld>
             <a:endParaRPr lang="en-GB"/>
           </a:p>
@@ -2237,7 +2237,7 @@
           <a:p>
             <a:fld id="{9AF20BB0-71AE-4107-B014-A2BC23E779E7}" type="datetime1">
               <a:rPr lang="en-GB" smtClean="0"/>
-              <a:t>16/05/2024</a:t>
+              <a:t>21/05/2024</a:t>
             </a:fld>
             <a:endParaRPr lang="en-GB"/>
           </a:p>
@@ -2382,7 +2382,7 @@
           <a:p>
             <a:fld id="{72530EF8-B2C4-45D1-9C57-5415AFB88FFD}" type="datetime1">
               <a:rPr lang="en-GB" smtClean="0"/>
-              <a:t>16/05/2024</a:t>
+              <a:t>21/05/2024</a:t>
             </a:fld>
             <a:endParaRPr lang="en-GB"/>
           </a:p>
@@ -2498,7 +2498,7 @@
           <a:p>
             <a:fld id="{9E7BD74F-8DB5-4E16-85A3-7EB5BBD6A1D0}" type="datetime1">
               <a:rPr lang="en-GB" smtClean="0"/>
-              <a:t>16/05/2024</a:t>
+              <a:t>21/05/2024</a:t>
             </a:fld>
             <a:endParaRPr lang="en-GB"/>
           </a:p>
@@ -2814,7 +2814,7 @@
           <a:p>
             <a:fld id="{88C743B4-2A34-40EC-A0AA-458AEED764AC}" type="datetime1">
               <a:rPr lang="en-GB" smtClean="0"/>
-              <a:t>16/05/2024</a:t>
+              <a:t>21/05/2024</a:t>
             </a:fld>
             <a:endParaRPr lang="en-GB"/>
           </a:p>
@@ -3106,7 +3106,7 @@
           <a:p>
             <a:fld id="{029BFF93-216F-4D16-9658-CAD79F528681}" type="datetime1">
               <a:rPr lang="en-GB" smtClean="0"/>
-              <a:t>16/05/2024</a:t>
+              <a:t>21/05/2024</a:t>
             </a:fld>
             <a:endParaRPr lang="en-GB"/>
           </a:p>
@@ -3352,7 +3352,7 @@
           <a:p>
             <a:fld id="{68877C4E-3FF8-4D7B-9C77-296658F7CF32}" type="datetime1">
               <a:rPr lang="en-GB" smtClean="0"/>
-              <a:t>16/05/2024</a:t>
+              <a:t>21/05/2024</a:t>
             </a:fld>
             <a:endParaRPr lang="en-GB"/>
           </a:p>
@@ -3798,7 +3798,7 @@
               <a:rPr lang="en-GB" dirty="0">
                 <a:latin typeface="Montserrat Light" pitchFamily="2" charset="0"/>
               </a:rPr>
-              <a:t>Weekly Update #13</a:t>
+              <a:t>Weekly Update #14</a:t>
             </a:r>
           </a:p>
         </p:txBody>
@@ -6071,8 +6071,8 @@
           </a:p>
         </p:txBody>
       </p:sp>
-      <mc:AlternateContent xmlns:mc="http://schemas.openxmlformats.org/markup-compatibility/2006">
-        <mc:Choice xmlns:a14="http://schemas.microsoft.com/office/drawing/2010/main" Requires="a14">
+      <mc:AlternateContent xmlns:mc="http://schemas.openxmlformats.org/markup-compatibility/2006" xmlns:a14="http://schemas.microsoft.com/office/drawing/2010/main">
+        <mc:Choice Requires="a14">
           <p:sp>
             <p:nvSpPr>
               <p:cNvPr id="3" name="Content Placeholder 2">
@@ -6517,7 +6517,7 @@
             </p:txBody>
           </p:sp>
         </mc:Choice>
-        <mc:Fallback>
+        <mc:Fallback xmlns="">
           <p:sp>
             <p:nvSpPr>
               <p:cNvPr id="3" name="Content Placeholder 2">
@@ -7049,8 +7049,8 @@
           </a:p>
         </p:txBody>
       </p:sp>
-      <mc:AlternateContent xmlns:mc="http://schemas.openxmlformats.org/markup-compatibility/2006">
-        <mc:Choice xmlns:a14="http://schemas.microsoft.com/office/drawing/2010/main" Requires="a14">
+      <mc:AlternateContent xmlns:mc="http://schemas.openxmlformats.org/markup-compatibility/2006" xmlns:a14="http://schemas.microsoft.com/office/drawing/2010/main">
+        <mc:Choice Requires="a14">
           <p:sp>
             <p:nvSpPr>
               <p:cNvPr id="3" name="Content Placeholder 2">
@@ -7167,7 +7167,7 @@
             </p:txBody>
           </p:sp>
         </mc:Choice>
-        <mc:Fallback>
+        <mc:Fallback xmlns="">
           <p:sp>
             <p:nvSpPr>
               <p:cNvPr id="3" name="Content Placeholder 2">
@@ -7716,8 +7716,8 @@
           </a:p>
         </p:txBody>
       </p:sp>
-      <mc:AlternateContent xmlns:mc="http://schemas.openxmlformats.org/markup-compatibility/2006">
-        <mc:Choice xmlns:a14="http://schemas.microsoft.com/office/drawing/2010/main" Requires="a14">
+      <mc:AlternateContent xmlns:mc="http://schemas.openxmlformats.org/markup-compatibility/2006" xmlns:a14="http://schemas.microsoft.com/office/drawing/2010/main">
+        <mc:Choice Requires="a14">
           <p:sp>
             <p:nvSpPr>
               <p:cNvPr id="3" name="Content Placeholder 2">
@@ -7978,7 +7978,7 @@
             </p:txBody>
           </p:sp>
         </mc:Choice>
-        <mc:Fallback>
+        <mc:Fallback xmlns="">
           <p:sp>
             <p:nvSpPr>
               <p:cNvPr id="3" name="Content Placeholder 2">
@@ -8564,8 +8564,8 @@
           </a:p>
         </p:txBody>
       </p:sp>
-      <mc:AlternateContent xmlns:mc="http://schemas.openxmlformats.org/markup-compatibility/2006">
-        <mc:Choice xmlns:a14="http://schemas.microsoft.com/office/drawing/2010/main" Requires="a14">
+      <mc:AlternateContent xmlns:mc="http://schemas.openxmlformats.org/markup-compatibility/2006" xmlns:a14="http://schemas.microsoft.com/office/drawing/2010/main">
+        <mc:Choice Requires="a14">
           <p:sp>
             <p:nvSpPr>
               <p:cNvPr id="3" name="Content Placeholder 2">
@@ -9771,7 +9771,7 @@
             </p:txBody>
           </p:sp>
         </mc:Choice>
-        <mc:Fallback>
+        <mc:Fallback xmlns="">
           <p:sp>
             <p:nvSpPr>
               <p:cNvPr id="3" name="Content Placeholder 2">
@@ -10277,8 +10277,8 @@
           </a:p>
         </p:txBody>
       </p:sp>
-      <mc:AlternateContent xmlns:mc="http://schemas.openxmlformats.org/markup-compatibility/2006">
-        <mc:Choice xmlns:a14="http://schemas.microsoft.com/office/drawing/2010/main" Requires="a14">
+      <mc:AlternateContent xmlns:mc="http://schemas.openxmlformats.org/markup-compatibility/2006" xmlns:a14="http://schemas.microsoft.com/office/drawing/2010/main">
+        <mc:Choice Requires="a14">
           <p:sp>
             <p:nvSpPr>
               <p:cNvPr id="3" name="Content Placeholder 2">
@@ -10660,7 +10660,7 @@
             </p:txBody>
           </p:sp>
         </mc:Choice>
-        <mc:Fallback>
+        <mc:Fallback xmlns="">
           <p:sp>
             <p:nvSpPr>
               <p:cNvPr id="3" name="Content Placeholder 2">
@@ -12424,15 +12424,6 @@
 </file>
 
 <file path=customXml/item1.xml><?xml version="1.0" encoding="utf-8"?>
-<?mso-contentType ?>
-<FormTemplates xmlns="http://schemas.microsoft.com/sharepoint/v3/contenttype/forms">
-  <Display>DocumentLibraryForm</Display>
-  <Edit>DocumentLibraryForm</Edit>
-  <New>DocumentLibraryForm</New>
-</FormTemplates>
-</file>
-
-<file path=customXml/item2.xml><?xml version="1.0" encoding="utf-8"?>
 <ct:contentTypeSchema xmlns:ct="http://schemas.microsoft.com/office/2006/metadata/contentType" xmlns:ma="http://schemas.microsoft.com/office/2006/metadata/properties/metaAttributes" ct:_="" ma:_="" ma:contentTypeName="Document" ma:contentTypeID="0x0101001CFAD911B2078E4FAC111FDBF9740ABB" ma:contentTypeVersion="7" ma:contentTypeDescription="Een nieuw document maken." ma:contentTypeScope="" ma:versionID="8be3cd228d68f4e4ba3fab0fbbe01390">
   <xsd:schema xmlns:xsd="http://www.w3.org/2001/XMLSchema" xmlns:xs="http://www.w3.org/2001/XMLSchema" xmlns:p="http://schemas.microsoft.com/office/2006/metadata/properties" xmlns:ns3="32f5fda4-97a3-47c7-8308-3025c576a379" xmlns:ns4="065d5d57-d9fb-4c30-80d3-68aca1ff0522" targetNamespace="http://schemas.microsoft.com/office/2006/metadata/properties" ma:root="true" ma:fieldsID="801ea412268bea31b4cd4d632ac8c751" ns3:_="" ns4:_="">
     <xsd:import namespace="32f5fda4-97a3-47c7-8308-3025c576a379"/>
@@ -12615,6 +12606,15 @@
 </ct:contentTypeSchema>
 </file>
 
+<file path=customXml/item2.xml><?xml version="1.0" encoding="utf-8"?>
+<?mso-contentType ?>
+<FormTemplates xmlns="http://schemas.microsoft.com/sharepoint/v3/contenttype/forms">
+  <Display>DocumentLibraryForm</Display>
+  <Edit>DocumentLibraryForm</Edit>
+  <New>DocumentLibraryForm</New>
+</FormTemplates>
+</file>
+
 <file path=customXml/item3.xml><?xml version="1.0" encoding="utf-8"?>
 <p:properties xmlns:p="http://schemas.microsoft.com/office/2006/metadata/properties" xmlns:xsi="http://www.w3.org/2001/XMLSchema-instance" xmlns:pc="http://schemas.microsoft.com/office/infopath/2007/PartnerControls">
   <documentManagement>
@@ -12624,14 +12624,6 @@
 </file>
 
 <file path=customXml/itemProps1.xml><?xml version="1.0" encoding="utf-8"?>
-<ds:datastoreItem xmlns:ds="http://schemas.openxmlformats.org/officeDocument/2006/customXml" ds:itemID="{C32F3C67-3F37-474D-9609-B4FDD4474BB4}">
-  <ds:schemaRefs>
-    <ds:schemaRef ds:uri="http://schemas.microsoft.com/sharepoint/v3/contenttype/forms"/>
-  </ds:schemaRefs>
-</ds:datastoreItem>
-</file>
-
-<file path=customXml/itemProps2.xml><?xml version="1.0" encoding="utf-8"?>
 <ds:datastoreItem xmlns:ds="http://schemas.openxmlformats.org/officeDocument/2006/customXml" ds:itemID="{E1FCE147-8410-4EC7-8887-8B99F5151F4F}">
   <ds:schemaRefs>
     <ds:schemaRef ds:uri="http://schemas.microsoft.com/office/2006/metadata/contentType"/>
@@ -12646,6 +12638,14 @@
     <ds:schemaRef ds:uri="http://purl.org/dc/elements/1.1/"/>
     <ds:schemaRef ds:uri="http://purl.org/dc/terms/"/>
     <ds:schemaRef ds:uri="http://schemas.microsoft.com/internal/obd"/>
+  </ds:schemaRefs>
+</ds:datastoreItem>
+</file>
+
+<file path=customXml/itemProps2.xml><?xml version="1.0" encoding="utf-8"?>
+<ds:datastoreItem xmlns:ds="http://schemas.openxmlformats.org/officeDocument/2006/customXml" ds:itemID="{C32F3C67-3F37-474D-9609-B4FDD4474BB4}">
+  <ds:schemaRefs>
+    <ds:schemaRef ds:uri="http://schemas.microsoft.com/sharepoint/v3/contenttype/forms"/>
   </ds:schemaRefs>
 </ds:datastoreItem>
 </file>

</xml_diff>